<commit_message>
correcting small mistale on pract4 sols
</commit_message>
<xml_diff>
--- a/Chanco_ST6103_GLM_2019_Henrion_Practical4_Solutions.pptx
+++ b/Chanco_ST6103_GLM_2019_Henrion_Practical4_Solutions.pptx
@@ -8496,9 +8496,34 @@
                         <m:type m:val="bar"/>
                       </m:fPr>
                       <m:num>
-                        <m:r>
-                          <m:t>1</m:t>
-                        </m:r>
+                        <m:sSup>
+                          <m:e>
+                            <m:r>
+                              <m:t>e</m:t>
+                            </m:r>
+                          </m:e>
+                          <m:sup>
+                            <m:sSub>
+                              <m:e>
+                                <m:acc>
+                                  <m:accPr>
+                                    <m:chr m:val="̂"/>
+                                  </m:accPr>
+                                  <m:e>
+                                    <m:r>
+                                      <m:t>β</m:t>
+                                    </m:r>
+                                  </m:e>
+                                </m:acc>
+                              </m:e>
+                              <m:sub>
+                                <m:r>
+                                  <m:t>0</m:t>
+                                </m:r>
+                              </m:sub>
+                            </m:sSub>
+                          </m:sup>
+                        </m:sSup>
                       </m:num>
                       <m:den>
                         <m:r>

</xml_diff>

<commit_message>
correcting a small misake on pract4 sols
</commit_message>
<xml_diff>
--- a/Chanco_ST6103_GLM_2019_Henrion_Practical4_Solutions.pptx
+++ b/Chanco_ST6103_GLM_2019_Henrion_Practical4_Solutions.pptx
@@ -4923,6 +4923,14 @@
             <a:r>
               <a:rPr/>
               <a:t>Exercise</a:t>
+            </a:r>
+            <a:r>
+              <a:rPr/>
+              <a:t> </a:t>
+            </a:r>
+            <a:r>
+              <a:rPr/>
+              <a:t>2</a:t>
             </a:r>
           </a:p>
         </p:txBody>

</xml_diff>